<commit_message>
styles and commentSection mostly.
</commit_message>
<xml_diff>
--- a/Informatik/Refactoring_Slaven_Mlinaric - v2 [Autosaved].pptx
+++ b/Informatik/Refactoring_Slaven_Mlinaric - v2 [Autosaved].pptx
@@ -15153,7 +15153,7 @@
           <a:p>
             <a:fld id="{6E56E307-6B2F-44D3-BAE8-85C161B1104B}" type="datetimeFigureOut">
               <a:rPr lang="en-DE" smtClean="0"/>
-              <a:t>01/01/2023</a:t>
+              <a:t>05/01/2023</a:t>
             </a:fld>
             <a:endParaRPr lang="en-DE"/>
           </a:p>
@@ -15477,7 +15477,7 @@
           <a:p>
             <a:fld id="{6E56E307-6B2F-44D3-BAE8-85C161B1104B}" type="datetimeFigureOut">
               <a:rPr lang="en-DE" smtClean="0"/>
-              <a:t>01/01/2023</a:t>
+              <a:t>05/01/2023</a:t>
             </a:fld>
             <a:endParaRPr lang="en-DE"/>
           </a:p>
@@ -15725,7 +15725,7 @@
           <a:p>
             <a:fld id="{6E56E307-6B2F-44D3-BAE8-85C161B1104B}" type="datetimeFigureOut">
               <a:rPr lang="en-DE" smtClean="0"/>
-              <a:t>01/01/2023</a:t>
+              <a:t>05/01/2023</a:t>
             </a:fld>
             <a:endParaRPr lang="en-DE"/>
           </a:p>
@@ -16064,7 +16064,7 @@
           <a:p>
             <a:fld id="{6E56E307-6B2F-44D3-BAE8-85C161B1104B}" type="datetimeFigureOut">
               <a:rPr lang="en-DE" smtClean="0"/>
-              <a:t>01/01/2023</a:t>
+              <a:t>05/01/2023</a:t>
             </a:fld>
             <a:endParaRPr lang="en-DE"/>
           </a:p>
@@ -16411,7 +16411,7 @@
           <a:p>
             <a:fld id="{6E56E307-6B2F-44D3-BAE8-85C161B1104B}" type="datetimeFigureOut">
               <a:rPr lang="en-DE" smtClean="0"/>
-              <a:t>01/01/2023</a:t>
+              <a:t>05/01/2023</a:t>
             </a:fld>
             <a:endParaRPr lang="en-DE"/>
           </a:p>
@@ -16785,7 +16785,7 @@
           <a:p>
             <a:fld id="{6E56E307-6B2F-44D3-BAE8-85C161B1104B}" type="datetimeFigureOut">
               <a:rPr lang="en-DE" smtClean="0"/>
-              <a:t>01/01/2023</a:t>
+              <a:t>05/01/2023</a:t>
             </a:fld>
             <a:endParaRPr lang="en-DE"/>
           </a:p>
@@ -17255,7 +17255,7 @@
           <a:p>
             <a:fld id="{6E56E307-6B2F-44D3-BAE8-85C161B1104B}" type="datetimeFigureOut">
               <a:rPr lang="en-DE" smtClean="0"/>
-              <a:t>01/01/2023</a:t>
+              <a:t>05/01/2023</a:t>
             </a:fld>
             <a:endParaRPr lang="en-DE"/>
           </a:p>
@@ -17460,7 +17460,7 @@
           <a:p>
             <a:fld id="{6E56E307-6B2F-44D3-BAE8-85C161B1104B}" type="datetimeFigureOut">
               <a:rPr lang="en-DE" smtClean="0"/>
-              <a:t>01/01/2023</a:t>
+              <a:t>05/01/2023</a:t>
             </a:fld>
             <a:endParaRPr lang="en-DE"/>
           </a:p>
@@ -17671,7 +17671,7 @@
           <a:p>
             <a:fld id="{6E56E307-6B2F-44D3-BAE8-85C161B1104B}" type="datetimeFigureOut">
               <a:rPr lang="en-DE" smtClean="0"/>
-              <a:t>01/01/2023</a:t>
+              <a:t>05/01/2023</a:t>
             </a:fld>
             <a:endParaRPr lang="en-DE"/>
           </a:p>
@@ -17903,7 +17903,7 @@
           <a:p>
             <a:fld id="{6E56E307-6B2F-44D3-BAE8-85C161B1104B}" type="datetimeFigureOut">
               <a:rPr lang="en-DE" smtClean="0"/>
-              <a:t>01/01/2023</a:t>
+              <a:t>05/01/2023</a:t>
             </a:fld>
             <a:endParaRPr lang="en-DE"/>
           </a:p>
@@ -18151,7 +18151,7 @@
           <a:p>
             <a:fld id="{6E56E307-6B2F-44D3-BAE8-85C161B1104B}" type="datetimeFigureOut">
               <a:rPr lang="en-DE" smtClean="0"/>
-              <a:t>01/01/2023</a:t>
+              <a:t>05/01/2023</a:t>
             </a:fld>
             <a:endParaRPr lang="en-DE"/>
           </a:p>
@@ -18449,7 +18449,7 @@
           <a:p>
             <a:fld id="{6E56E307-6B2F-44D3-BAE8-85C161B1104B}" type="datetimeFigureOut">
               <a:rPr lang="en-DE" smtClean="0"/>
-              <a:t>01/01/2023</a:t>
+              <a:t>05/01/2023</a:t>
             </a:fld>
             <a:endParaRPr lang="en-DE"/>
           </a:p>
@@ -18843,7 +18843,7 @@
           <a:p>
             <a:fld id="{6E56E307-6B2F-44D3-BAE8-85C161B1104B}" type="datetimeFigureOut">
               <a:rPr lang="en-DE" smtClean="0"/>
-              <a:t>01/01/2023</a:t>
+              <a:t>05/01/2023</a:t>
             </a:fld>
             <a:endParaRPr lang="en-DE"/>
           </a:p>
@@ -18992,7 +18992,7 @@
           <a:p>
             <a:fld id="{6E56E307-6B2F-44D3-BAE8-85C161B1104B}" type="datetimeFigureOut">
               <a:rPr lang="en-DE" smtClean="0"/>
-              <a:t>01/01/2023</a:t>
+              <a:t>05/01/2023</a:t>
             </a:fld>
             <a:endParaRPr lang="en-DE"/>
           </a:p>
@@ -19118,7 +19118,7 @@
           <a:p>
             <a:fld id="{6E56E307-6B2F-44D3-BAE8-85C161B1104B}" type="datetimeFigureOut">
               <a:rPr lang="en-DE" smtClean="0"/>
-              <a:t>01/01/2023</a:t>
+              <a:t>05/01/2023</a:t>
             </a:fld>
             <a:endParaRPr lang="en-DE"/>
           </a:p>
@@ -19373,7 +19373,7 @@
           <a:p>
             <a:fld id="{6E56E307-6B2F-44D3-BAE8-85C161B1104B}" type="datetimeFigureOut">
               <a:rPr lang="en-DE" smtClean="0"/>
-              <a:t>01/01/2023</a:t>
+              <a:t>05/01/2023</a:t>
             </a:fld>
             <a:endParaRPr lang="en-DE"/>
           </a:p>
@@ -19688,7 +19688,7 @@
           <a:p>
             <a:fld id="{6E56E307-6B2F-44D3-BAE8-85C161B1104B}" type="datetimeFigureOut">
               <a:rPr lang="en-DE" smtClean="0"/>
-              <a:t>01/01/2023</a:t>
+              <a:t>05/01/2023</a:t>
             </a:fld>
             <a:endParaRPr lang="en-DE"/>
           </a:p>
@@ -20039,7 +20039,7 @@
           <a:p>
             <a:fld id="{6E56E307-6B2F-44D3-BAE8-85C161B1104B}" type="datetimeFigureOut">
               <a:rPr lang="en-DE" smtClean="0"/>
-              <a:t>01/01/2023</a:t>
+              <a:t>05/01/2023</a:t>
             </a:fld>
             <a:endParaRPr lang="en-DE"/>
           </a:p>
@@ -33568,7 +33568,7 @@
         <p:spPr>
           <a:xfrm>
             <a:off x="4587957" y="5684207"/>
-            <a:ext cx="3012909" cy="276999"/>
+            <a:ext cx="3268664" cy="276999"/>
           </a:xfrm>
           <a:prstGeom prst="rect">
             <a:avLst/>
@@ -33583,7 +33583,7 @@
           <a:p>
             <a:r>
               <a:rPr lang="en-GB" sz="1200" i="1" dirty="0"/>
-              <a:t>Source: Own creation with </a:t>
+              <a:t>Source: Own presentation with </a:t>
             </a:r>
             <a:r>
               <a:rPr lang="en-GB" sz="1200" i="1" dirty="0">
@@ -39598,7 +39598,7 @@
           <a:lstStyle/>
           <a:p>
             <a:r>
-              <a:rPr lang="en-GB" dirty="0"/>
+              <a:rPr lang="en-GB"/>
               <a:t>Example:</a:t>
             </a:r>
             <a:endParaRPr lang="en-DE" dirty="0"/>
@@ -39630,7 +39630,7 @@
           <a:p>
             <a:pPr algn="ctr"/>
             <a:r>
-              <a:rPr lang="en-GB" dirty="0"/>
+              <a:rPr lang="en-GB"/>
               <a:t>Imagine a company of theatrical players who go out to various events performing plays. Typically, a customer will request a few plays and the company charges them based on the size of the audience and the kind of play they perform. There are currently two kinds of plays that the company performs: tragedies and comedies. As well as providing a bill for the performance, the company gives its customers “volume credits” which they can use for discounts on future performances—think of it as a customer loyalty mechanism. (Fowler, 1999, S. 6)</a:t>
             </a:r>
           </a:p>

</xml_diff>